<commit_message>
Made changes to the poster
</commit_message>
<xml_diff>
--- a/Open Day Poster.pptx
+++ b/Open Day Poster.pptx
@@ -330,7 +330,7 @@
     </p:spTree>
     <p:extLst>
       <p:ext uri="{BB962C8B-B14F-4D97-AF65-F5344CB8AC3E}">
-        <p14:creationId xmlns:p14="http://schemas.microsoft.com/office/powerpoint/2010/main" xmlns="" val="1642703577"/>
+        <p14:creationId xmlns="" xmlns:p14="http://schemas.microsoft.com/office/powerpoint/2010/main" val="1642703577"/>
       </p:ext>
     </p:extLst>
   </p:cSld>
@@ -515,7 +515,7 @@
     </p:spTree>
     <p:extLst>
       <p:ext uri="{BB962C8B-B14F-4D97-AF65-F5344CB8AC3E}">
-        <p14:creationId xmlns:p14="http://schemas.microsoft.com/office/powerpoint/2010/main" xmlns="" val="1526960726"/>
+        <p14:creationId xmlns="" xmlns:p14="http://schemas.microsoft.com/office/powerpoint/2010/main" val="1526960726"/>
       </p:ext>
     </p:extLst>
   </p:cSld>
@@ -710,7 +710,7 @@
     </p:spTree>
     <p:extLst>
       <p:ext uri="{BB962C8B-B14F-4D97-AF65-F5344CB8AC3E}">
-        <p14:creationId xmlns:p14="http://schemas.microsoft.com/office/powerpoint/2010/main" xmlns="" val="1199340232"/>
+        <p14:creationId xmlns="" xmlns:p14="http://schemas.microsoft.com/office/powerpoint/2010/main" val="1199340232"/>
       </p:ext>
     </p:extLst>
   </p:cSld>
@@ -895,7 +895,7 @@
     </p:spTree>
     <p:extLst>
       <p:ext uri="{BB962C8B-B14F-4D97-AF65-F5344CB8AC3E}">
-        <p14:creationId xmlns:p14="http://schemas.microsoft.com/office/powerpoint/2010/main" xmlns="" val="869252807"/>
+        <p14:creationId xmlns="" xmlns:p14="http://schemas.microsoft.com/office/powerpoint/2010/main" val="869252807"/>
       </p:ext>
     </p:extLst>
   </p:cSld>
@@ -1102,7 +1102,7 @@
     </p:spTree>
     <p:extLst>
       <p:ext uri="{BB962C8B-B14F-4D97-AF65-F5344CB8AC3E}">
-        <p14:creationId xmlns:p14="http://schemas.microsoft.com/office/powerpoint/2010/main" xmlns="" val="200676708"/>
+        <p14:creationId xmlns="" xmlns:p14="http://schemas.microsoft.com/office/powerpoint/2010/main" val="200676708"/>
       </p:ext>
     </p:extLst>
   </p:cSld>
@@ -1405,7 +1405,7 @@
     </p:spTree>
     <p:extLst>
       <p:ext uri="{BB962C8B-B14F-4D97-AF65-F5344CB8AC3E}">
-        <p14:creationId xmlns:p14="http://schemas.microsoft.com/office/powerpoint/2010/main" xmlns="" val="1224105566"/>
+        <p14:creationId xmlns="" xmlns:p14="http://schemas.microsoft.com/office/powerpoint/2010/main" val="1224105566"/>
       </p:ext>
     </p:extLst>
   </p:cSld>
@@ -1842,7 +1842,7 @@
     </p:spTree>
     <p:extLst>
       <p:ext uri="{BB962C8B-B14F-4D97-AF65-F5344CB8AC3E}">
-        <p14:creationId xmlns:p14="http://schemas.microsoft.com/office/powerpoint/2010/main" xmlns="" val="648909502"/>
+        <p14:creationId xmlns="" xmlns:p14="http://schemas.microsoft.com/office/powerpoint/2010/main" val="648909502"/>
       </p:ext>
     </p:extLst>
   </p:cSld>
@@ -1975,7 +1975,7 @@
     </p:spTree>
     <p:extLst>
       <p:ext uri="{BB962C8B-B14F-4D97-AF65-F5344CB8AC3E}">
-        <p14:creationId xmlns:p14="http://schemas.microsoft.com/office/powerpoint/2010/main" xmlns="" val="1300040648"/>
+        <p14:creationId xmlns="" xmlns:p14="http://schemas.microsoft.com/office/powerpoint/2010/main" val="1300040648"/>
       </p:ext>
     </p:extLst>
   </p:cSld>
@@ -2085,7 +2085,7 @@
     </p:spTree>
     <p:extLst>
       <p:ext uri="{BB962C8B-B14F-4D97-AF65-F5344CB8AC3E}">
-        <p14:creationId xmlns:p14="http://schemas.microsoft.com/office/powerpoint/2010/main" xmlns="" val="1284546358"/>
+        <p14:creationId xmlns="" xmlns:p14="http://schemas.microsoft.com/office/powerpoint/2010/main" val="1284546358"/>
       </p:ext>
     </p:extLst>
   </p:cSld>
@@ -2377,7 +2377,7 @@
     </p:spTree>
     <p:extLst>
       <p:ext uri="{BB962C8B-B14F-4D97-AF65-F5344CB8AC3E}">
-        <p14:creationId xmlns:p14="http://schemas.microsoft.com/office/powerpoint/2010/main" xmlns="" val="717535615"/>
+        <p14:creationId xmlns="" xmlns:p14="http://schemas.microsoft.com/office/powerpoint/2010/main" val="717535615"/>
       </p:ext>
     </p:extLst>
   </p:cSld>
@@ -2650,7 +2650,7 @@
     </p:spTree>
     <p:extLst>
       <p:ext uri="{BB962C8B-B14F-4D97-AF65-F5344CB8AC3E}">
-        <p14:creationId xmlns:p14="http://schemas.microsoft.com/office/powerpoint/2010/main" xmlns="" val="1500403400"/>
+        <p14:creationId xmlns="" xmlns:p14="http://schemas.microsoft.com/office/powerpoint/2010/main" val="1500403400"/>
       </p:ext>
     </p:extLst>
   </p:cSld>
@@ -2709,14 +2709,14 @@
           </a:ln>
           <a:extLst>
             <a:ext uri="{909E8E84-426E-40DD-AFC4-6F175D3DCCD1}">
-              <a14:hiddenFill xmlns:a14="http://schemas.microsoft.com/office/drawing/2010/main" xmlns="">
+              <a14:hiddenFill xmlns="" xmlns:a14="http://schemas.microsoft.com/office/drawing/2010/main">
                 <a:solidFill>
                   <a:srgbClr val="FFFFFF"/>
                 </a:solidFill>
               </a14:hiddenFill>
             </a:ext>
             <a:ext uri="{91240B29-F687-4F45-9708-019B960494DF}">
-              <a14:hiddenLine xmlns:a14="http://schemas.microsoft.com/office/drawing/2010/main" xmlns="" w="9525">
+              <a14:hiddenLine xmlns="" xmlns:a14="http://schemas.microsoft.com/office/drawing/2010/main" w="9525">
                 <a:solidFill>
                   <a:srgbClr val="000000"/>
                 </a:solidFill>
@@ -2726,7 +2726,7 @@
               </a14:hiddenLine>
             </a:ext>
             <a:ext uri="{FAA26D3D-D897-4be2-8F04-BA451C77F1D7}">
-              <ma14:placeholderFlag xmlns:ma14="http://schemas.microsoft.com/office/mac/drawingml/2011/main" xmlns="" val="1"/>
+              <ma14:placeholderFlag xmlns="" xmlns:ma14="http://schemas.microsoft.com/office/mac/drawingml/2011/main" val="1"/>
             </a:ext>
           </a:extLst>
         </p:spPr>
@@ -2771,14 +2771,14 @@
           </a:ln>
           <a:extLst>
             <a:ext uri="{909E8E84-426E-40DD-AFC4-6F175D3DCCD1}">
-              <a14:hiddenFill xmlns:a14="http://schemas.microsoft.com/office/drawing/2010/main" xmlns="">
+              <a14:hiddenFill xmlns="" xmlns:a14="http://schemas.microsoft.com/office/drawing/2010/main">
                 <a:solidFill>
                   <a:srgbClr val="FFFFFF"/>
                 </a:solidFill>
               </a14:hiddenFill>
             </a:ext>
             <a:ext uri="{91240B29-F687-4F45-9708-019B960494DF}">
-              <a14:hiddenLine xmlns:a14="http://schemas.microsoft.com/office/drawing/2010/main" xmlns="" w="9525">
+              <a14:hiddenLine xmlns="" xmlns:a14="http://schemas.microsoft.com/office/drawing/2010/main" w="9525">
                 <a:solidFill>
                   <a:srgbClr val="000000"/>
                 </a:solidFill>
@@ -2788,7 +2788,7 @@
               </a14:hiddenLine>
             </a:ext>
             <a:ext uri="{FAA26D3D-D897-4be2-8F04-BA451C77F1D7}">
-              <ma14:placeholderFlag xmlns:ma14="http://schemas.microsoft.com/office/mac/drawingml/2011/main" xmlns="" val="1"/>
+              <ma14:placeholderFlag xmlns="" xmlns:ma14="http://schemas.microsoft.com/office/mac/drawingml/2011/main" val="1"/>
             </a:ext>
           </a:extLst>
         </p:spPr>
@@ -3405,7 +3405,7 @@
           </a:ln>
           <a:extLst>
             <a:ext uri="{909E8E84-426E-40DD-AFC4-6F175D3DCCD1}">
-              <a14:hiddenFill xmlns:a14="http://schemas.microsoft.com/office/drawing/2010/main" xmlns="">
+              <a14:hiddenFill xmlns="" xmlns:a14="http://schemas.microsoft.com/office/drawing/2010/main">
                 <a:noFill/>
               </a14:hiddenFill>
             </a:ext>
@@ -3431,7 +3431,7 @@
           <a:blip r:embed="rId2" cstate="print">
             <a:extLst>
               <a:ext uri="{28A0092B-C50C-407E-A947-70E740481C1C}">
-                <a14:useLocalDpi xmlns:a14="http://schemas.microsoft.com/office/drawing/2010/main" xmlns="" val="0"/>
+                <a14:useLocalDpi xmlns="" xmlns:a14="http://schemas.microsoft.com/office/drawing/2010/main" val="0"/>
               </a:ext>
             </a:extLst>
           </a:blip>
@@ -3454,14 +3454,14 @@
           </a:ln>
           <a:extLst>
             <a:ext uri="{909E8E84-426E-40DD-AFC4-6F175D3DCCD1}">
-              <a14:hiddenFill xmlns:a14="http://schemas.microsoft.com/office/drawing/2010/main" xmlns="">
+              <a14:hiddenFill xmlns="" xmlns:a14="http://schemas.microsoft.com/office/drawing/2010/main">
                 <a:solidFill>
                   <a:srgbClr val="FFFFFF"/>
                 </a:solidFill>
               </a14:hiddenFill>
             </a:ext>
             <a:ext uri="{91240B29-F687-4F45-9708-019B960494DF}">
-              <a14:hiddenLine xmlns:a14="http://schemas.microsoft.com/office/drawing/2010/main" xmlns="" w="9525">
+              <a14:hiddenLine xmlns="" xmlns:a14="http://schemas.microsoft.com/office/drawing/2010/main" w="9525">
                 <a:solidFill>
                   <a:srgbClr val="000000"/>
                 </a:solidFill>
@@ -3497,7 +3497,7 @@
           </a:ln>
           <a:extLst>
             <a:ext uri="{91240B29-F687-4F45-9708-019B960494DF}">
-              <a14:hiddenLine xmlns:a14="http://schemas.microsoft.com/office/drawing/2010/main" xmlns="" w="9525">
+              <a14:hiddenLine xmlns="" xmlns:a14="http://schemas.microsoft.com/office/drawing/2010/main" w="9525">
                 <a:solidFill>
                   <a:srgbClr val="000000"/>
                 </a:solidFill>
@@ -3626,7 +3626,7 @@
           <a:blip r:embed="rId3" cstate="print">
             <a:extLst>
               <a:ext uri="{28A0092B-C50C-407E-A947-70E740481C1C}">
-                <a14:useLocalDpi xmlns:a14="http://schemas.microsoft.com/office/drawing/2010/main" xmlns="" val="0"/>
+                <a14:useLocalDpi xmlns="" xmlns:a14="http://schemas.microsoft.com/office/drawing/2010/main" val="0"/>
               </a:ext>
             </a:extLst>
           </a:blip>
@@ -3649,14 +3649,14 @@
           </a:ln>
           <a:extLst>
             <a:ext uri="{909E8E84-426E-40DD-AFC4-6F175D3DCCD1}">
-              <a14:hiddenFill xmlns:a14="http://schemas.microsoft.com/office/drawing/2010/main" xmlns="">
+              <a14:hiddenFill xmlns="" xmlns:a14="http://schemas.microsoft.com/office/drawing/2010/main">
                 <a:solidFill>
                   <a:srgbClr val="FFFFFF"/>
                 </a:solidFill>
               </a14:hiddenFill>
             </a:ext>
             <a:ext uri="{91240B29-F687-4F45-9708-019B960494DF}">
-              <a14:hiddenLine xmlns:a14="http://schemas.microsoft.com/office/drawing/2010/main" xmlns="" w="9525">
+              <a14:hiddenLine xmlns="" xmlns:a14="http://schemas.microsoft.com/office/drawing/2010/main" w="9525">
                 <a:solidFill>
                   <a:srgbClr val="000000"/>
                 </a:solidFill>
@@ -3690,14 +3690,14 @@
           </a:ln>
           <a:extLst>
             <a:ext uri="{909E8E84-426E-40DD-AFC4-6F175D3DCCD1}">
-              <a14:hiddenFill xmlns:a14="http://schemas.microsoft.com/office/drawing/2010/main" xmlns="">
+              <a14:hiddenFill xmlns="" xmlns:a14="http://schemas.microsoft.com/office/drawing/2010/main">
                 <a:solidFill>
                   <a:srgbClr val="FFFFFF"/>
                 </a:solidFill>
               </a14:hiddenFill>
             </a:ext>
             <a:ext uri="{91240B29-F687-4F45-9708-019B960494DF}">
-              <a14:hiddenLine xmlns:a14="http://schemas.microsoft.com/office/drawing/2010/main" xmlns="" w="9525">
+              <a14:hiddenLine xmlns="" xmlns:a14="http://schemas.microsoft.com/office/drawing/2010/main" w="9525">
                 <a:solidFill>
                   <a:srgbClr val="000000"/>
                 </a:solidFill>
@@ -3829,140 +3829,6 @@
                 <a:schemeClr val="bg1"/>
               </a:solidFill>
             </a:endParaRPr>
-          </a:p>
-        </p:txBody>
-      </p:sp>
-      <p:sp>
-        <p:nvSpPr>
-          <p:cNvPr id="2056" name="Rectangle 8"/>
-          <p:cNvSpPr>
-            <a:spLocks noChangeArrowheads="1"/>
-          </p:cNvSpPr>
-          <p:nvPr/>
-        </p:nvSpPr>
-        <p:spPr bwMode="auto">
-          <a:xfrm>
-            <a:off x="144438" y="2394372"/>
-            <a:ext cx="7344816" cy="3899965"/>
-          </a:xfrm>
-          <a:prstGeom prst="rect">
-            <a:avLst/>
-          </a:prstGeom>
-          <a:solidFill>
-            <a:schemeClr val="bg1"/>
-          </a:solidFill>
-          <a:ln w="9525">
-            <a:solidFill>
-              <a:schemeClr val="tx1"/>
-            </a:solidFill>
-            <a:miter lim="800000"/>
-            <a:headEnd/>
-            <a:tailEnd/>
-          </a:ln>
-        </p:spPr>
-        <p:txBody>
-          <a:bodyPr/>
-          <a:lstStyle>
-            <a:lvl1pPr eaLnBrk="0" hangingPunct="0">
-              <a:defRPr sz="2900">
-                <a:solidFill>
-                  <a:schemeClr val="tx1"/>
-                </a:solidFill>
-                <a:latin typeface="Arial" charset="0"/>
-              </a:defRPr>
-            </a:lvl1pPr>
-            <a:lvl2pPr marL="742950" indent="-285750" eaLnBrk="0" hangingPunct="0">
-              <a:defRPr sz="2900">
-                <a:solidFill>
-                  <a:schemeClr val="tx1"/>
-                </a:solidFill>
-                <a:latin typeface="Arial" charset="0"/>
-              </a:defRPr>
-            </a:lvl2pPr>
-            <a:lvl3pPr marL="1143000" indent="-228600" eaLnBrk="0" hangingPunct="0">
-              <a:defRPr sz="2900">
-                <a:solidFill>
-                  <a:schemeClr val="tx1"/>
-                </a:solidFill>
-                <a:latin typeface="Arial" charset="0"/>
-              </a:defRPr>
-            </a:lvl3pPr>
-            <a:lvl4pPr marL="1600200" indent="-228600" eaLnBrk="0" hangingPunct="0">
-              <a:defRPr sz="2900">
-                <a:solidFill>
-                  <a:schemeClr val="tx1"/>
-                </a:solidFill>
-                <a:latin typeface="Arial" charset="0"/>
-              </a:defRPr>
-            </a:lvl4pPr>
-            <a:lvl5pPr marL="2057400" indent="-228600" eaLnBrk="0" hangingPunct="0">
-              <a:defRPr sz="2900">
-                <a:solidFill>
-                  <a:schemeClr val="tx1"/>
-                </a:solidFill>
-                <a:latin typeface="Arial" charset="0"/>
-              </a:defRPr>
-            </a:lvl5pPr>
-            <a:lvl6pPr marL="2514600" indent="-228600" eaLnBrk="0" fontAlgn="base" hangingPunct="0">
-              <a:spcBef>
-                <a:spcPct val="0"/>
-              </a:spcBef>
-              <a:spcAft>
-                <a:spcPct val="0"/>
-              </a:spcAft>
-              <a:defRPr sz="2900">
-                <a:solidFill>
-                  <a:schemeClr val="tx1"/>
-                </a:solidFill>
-                <a:latin typeface="Arial" charset="0"/>
-              </a:defRPr>
-            </a:lvl6pPr>
-            <a:lvl7pPr marL="2971800" indent="-228600" eaLnBrk="0" fontAlgn="base" hangingPunct="0">
-              <a:spcBef>
-                <a:spcPct val="0"/>
-              </a:spcBef>
-              <a:spcAft>
-                <a:spcPct val="0"/>
-              </a:spcAft>
-              <a:defRPr sz="2900">
-                <a:solidFill>
-                  <a:schemeClr val="tx1"/>
-                </a:solidFill>
-                <a:latin typeface="Arial" charset="0"/>
-              </a:defRPr>
-            </a:lvl7pPr>
-            <a:lvl8pPr marL="3429000" indent="-228600" eaLnBrk="0" fontAlgn="base" hangingPunct="0">
-              <a:spcBef>
-                <a:spcPct val="0"/>
-              </a:spcBef>
-              <a:spcAft>
-                <a:spcPct val="0"/>
-              </a:spcAft>
-              <a:defRPr sz="2900">
-                <a:solidFill>
-                  <a:schemeClr val="tx1"/>
-                </a:solidFill>
-                <a:latin typeface="Arial" charset="0"/>
-              </a:defRPr>
-            </a:lvl8pPr>
-            <a:lvl9pPr marL="3886200" indent="-228600" eaLnBrk="0" fontAlgn="base" hangingPunct="0">
-              <a:spcBef>
-                <a:spcPct val="0"/>
-              </a:spcBef>
-              <a:spcAft>
-                <a:spcPct val="0"/>
-              </a:spcAft>
-              <a:defRPr sz="2900">
-                <a:solidFill>
-                  <a:schemeClr val="tx1"/>
-                </a:solidFill>
-                <a:latin typeface="Arial" charset="0"/>
-              </a:defRPr>
-            </a:lvl9pPr>
-          </a:lstStyle>
-          <a:p>
-            <a:pPr eaLnBrk="1" hangingPunct="1"/>
-            <a:endParaRPr lang="x-none" altLang="x-none" sz="2000"/>
           </a:p>
         </p:txBody>
       </p:sp>
@@ -4122,14 +3988,14 @@
           </a:ln>
           <a:extLst>
             <a:ext uri="{909E8E84-426E-40DD-AFC4-6F175D3DCCD1}">
-              <a14:hiddenFill xmlns:a14="http://schemas.microsoft.com/office/drawing/2010/main" xmlns="">
+              <a14:hiddenFill xmlns="" xmlns:a14="http://schemas.microsoft.com/office/drawing/2010/main">
                 <a:solidFill>
                   <a:srgbClr val="FFFFFF"/>
                 </a:solidFill>
               </a14:hiddenFill>
             </a:ext>
             <a:ext uri="{91240B29-F687-4F45-9708-019B960494DF}">
-              <a14:hiddenLine xmlns:a14="http://schemas.microsoft.com/office/drawing/2010/main" xmlns="" w="9525">
+              <a14:hiddenLine xmlns="" xmlns:a14="http://schemas.microsoft.com/office/drawing/2010/main" w="9525">
                 <a:solidFill>
                   <a:srgbClr val="000000"/>
                 </a:solidFill>
@@ -4274,14 +4140,14 @@
           </a:ln>
           <a:extLst>
             <a:ext uri="{909E8E84-426E-40DD-AFC4-6F175D3DCCD1}">
-              <a14:hiddenFill xmlns:a14="http://schemas.microsoft.com/office/drawing/2010/main" xmlns="">
+              <a14:hiddenFill xmlns="" xmlns:a14="http://schemas.microsoft.com/office/drawing/2010/main">
                 <a:solidFill>
                   <a:srgbClr val="FFFFFF"/>
                 </a:solidFill>
               </a14:hiddenFill>
             </a:ext>
             <a:ext uri="{91240B29-F687-4F45-9708-019B960494DF}">
-              <a14:hiddenLine xmlns:a14="http://schemas.microsoft.com/office/drawing/2010/main" xmlns="" w="9525">
+              <a14:hiddenLine xmlns="" xmlns:a14="http://schemas.microsoft.com/office/drawing/2010/main" w="9525">
                 <a:solidFill>
                   <a:srgbClr val="000000"/>
                 </a:solidFill>
@@ -4582,6 +4448,140 @@
           </a:p>
         </p:txBody>
       </p:sp>
+      <p:sp>
+        <p:nvSpPr>
+          <p:cNvPr id="19" name="Rectangle 10"/>
+          <p:cNvSpPr>
+            <a:spLocks noChangeArrowheads="1"/>
+          </p:cNvSpPr>
+          <p:nvPr/>
+        </p:nvSpPr>
+        <p:spPr bwMode="auto">
+          <a:xfrm>
+            <a:off x="144438" y="6426820"/>
+            <a:ext cx="10945216" cy="3899965"/>
+          </a:xfrm>
+          <a:prstGeom prst="rect">
+            <a:avLst/>
+          </a:prstGeom>
+          <a:solidFill>
+            <a:schemeClr val="bg1"/>
+          </a:solidFill>
+          <a:ln w="9525">
+            <a:solidFill>
+              <a:schemeClr val="tx1"/>
+            </a:solidFill>
+            <a:miter lim="800000"/>
+            <a:headEnd/>
+            <a:tailEnd/>
+          </a:ln>
+        </p:spPr>
+        <p:txBody>
+          <a:bodyPr/>
+          <a:lstStyle>
+            <a:lvl1pPr eaLnBrk="0" hangingPunct="0">
+              <a:defRPr sz="2900">
+                <a:solidFill>
+                  <a:schemeClr val="tx1"/>
+                </a:solidFill>
+                <a:latin typeface="Arial" charset="0"/>
+              </a:defRPr>
+            </a:lvl1pPr>
+            <a:lvl2pPr marL="742950" indent="-285750" eaLnBrk="0" hangingPunct="0">
+              <a:defRPr sz="2900">
+                <a:solidFill>
+                  <a:schemeClr val="tx1"/>
+                </a:solidFill>
+                <a:latin typeface="Arial" charset="0"/>
+              </a:defRPr>
+            </a:lvl2pPr>
+            <a:lvl3pPr marL="1143000" indent="-228600" eaLnBrk="0" hangingPunct="0">
+              <a:defRPr sz="2900">
+                <a:solidFill>
+                  <a:schemeClr val="tx1"/>
+                </a:solidFill>
+                <a:latin typeface="Arial" charset="0"/>
+              </a:defRPr>
+            </a:lvl3pPr>
+            <a:lvl4pPr marL="1600200" indent="-228600" eaLnBrk="0" hangingPunct="0">
+              <a:defRPr sz="2900">
+                <a:solidFill>
+                  <a:schemeClr val="tx1"/>
+                </a:solidFill>
+                <a:latin typeface="Arial" charset="0"/>
+              </a:defRPr>
+            </a:lvl4pPr>
+            <a:lvl5pPr marL="2057400" indent="-228600" eaLnBrk="0" hangingPunct="0">
+              <a:defRPr sz="2900">
+                <a:solidFill>
+                  <a:schemeClr val="tx1"/>
+                </a:solidFill>
+                <a:latin typeface="Arial" charset="0"/>
+              </a:defRPr>
+            </a:lvl5pPr>
+            <a:lvl6pPr marL="2514600" indent="-228600" eaLnBrk="0" fontAlgn="base" hangingPunct="0">
+              <a:spcBef>
+                <a:spcPct val="0"/>
+              </a:spcBef>
+              <a:spcAft>
+                <a:spcPct val="0"/>
+              </a:spcAft>
+              <a:defRPr sz="2900">
+                <a:solidFill>
+                  <a:schemeClr val="tx1"/>
+                </a:solidFill>
+                <a:latin typeface="Arial" charset="0"/>
+              </a:defRPr>
+            </a:lvl6pPr>
+            <a:lvl7pPr marL="2971800" indent="-228600" eaLnBrk="0" fontAlgn="base" hangingPunct="0">
+              <a:spcBef>
+                <a:spcPct val="0"/>
+              </a:spcBef>
+              <a:spcAft>
+                <a:spcPct val="0"/>
+              </a:spcAft>
+              <a:defRPr sz="2900">
+                <a:solidFill>
+                  <a:schemeClr val="tx1"/>
+                </a:solidFill>
+                <a:latin typeface="Arial" charset="0"/>
+              </a:defRPr>
+            </a:lvl7pPr>
+            <a:lvl8pPr marL="3429000" indent="-228600" eaLnBrk="0" fontAlgn="base" hangingPunct="0">
+              <a:spcBef>
+                <a:spcPct val="0"/>
+              </a:spcBef>
+              <a:spcAft>
+                <a:spcPct val="0"/>
+              </a:spcAft>
+              <a:defRPr sz="2900">
+                <a:solidFill>
+                  <a:schemeClr val="tx1"/>
+                </a:solidFill>
+                <a:latin typeface="Arial" charset="0"/>
+              </a:defRPr>
+            </a:lvl8pPr>
+            <a:lvl9pPr marL="3886200" indent="-228600" eaLnBrk="0" fontAlgn="base" hangingPunct="0">
+              <a:spcBef>
+                <a:spcPct val="0"/>
+              </a:spcBef>
+              <a:spcAft>
+                <a:spcPct val="0"/>
+              </a:spcAft>
+              <a:defRPr sz="2900">
+                <a:solidFill>
+                  <a:schemeClr val="tx1"/>
+                </a:solidFill>
+                <a:latin typeface="Arial" charset="0"/>
+              </a:defRPr>
+            </a:lvl9pPr>
+          </a:lstStyle>
+          <a:p>
+            <a:pPr eaLnBrk="1" hangingPunct="1"/>
+            <a:endParaRPr lang="x-none" altLang="x-none" sz="2000"/>
+          </a:p>
+        </p:txBody>
+      </p:sp>
       <p:pic>
         <p:nvPicPr>
           <p:cNvPr id="1027" name="Picture 3"/>
@@ -4599,8 +4599,8 @@
         </p:blipFill>
         <p:spPr bwMode="auto">
           <a:xfrm>
-            <a:off x="920198" y="2970436"/>
-            <a:ext cx="5848976" cy="3298438"/>
+            <a:off x="5689054" y="7146900"/>
+            <a:ext cx="5328592" cy="3004976"/>
           </a:xfrm>
           <a:prstGeom prst="rect">
             <a:avLst/>
@@ -4614,140 +4614,6 @@
           </a:ln>
         </p:spPr>
       </p:pic>
-      <p:sp>
-        <p:nvSpPr>
-          <p:cNvPr id="19" name="Rectangle 10"/>
-          <p:cNvSpPr>
-            <a:spLocks noChangeArrowheads="1"/>
-          </p:cNvSpPr>
-          <p:nvPr/>
-        </p:nvSpPr>
-        <p:spPr bwMode="auto">
-          <a:xfrm>
-            <a:off x="144438" y="6426820"/>
-            <a:ext cx="7344816" cy="3899965"/>
-          </a:xfrm>
-          <a:prstGeom prst="rect">
-            <a:avLst/>
-          </a:prstGeom>
-          <a:solidFill>
-            <a:schemeClr val="bg1"/>
-          </a:solidFill>
-          <a:ln w="9525">
-            <a:solidFill>
-              <a:schemeClr val="tx1"/>
-            </a:solidFill>
-            <a:miter lim="800000"/>
-            <a:headEnd/>
-            <a:tailEnd/>
-          </a:ln>
-        </p:spPr>
-        <p:txBody>
-          <a:bodyPr/>
-          <a:lstStyle>
-            <a:lvl1pPr eaLnBrk="0" hangingPunct="0">
-              <a:defRPr sz="2900">
-                <a:solidFill>
-                  <a:schemeClr val="tx1"/>
-                </a:solidFill>
-                <a:latin typeface="Arial" charset="0"/>
-              </a:defRPr>
-            </a:lvl1pPr>
-            <a:lvl2pPr marL="742950" indent="-285750" eaLnBrk="0" hangingPunct="0">
-              <a:defRPr sz="2900">
-                <a:solidFill>
-                  <a:schemeClr val="tx1"/>
-                </a:solidFill>
-                <a:latin typeface="Arial" charset="0"/>
-              </a:defRPr>
-            </a:lvl2pPr>
-            <a:lvl3pPr marL="1143000" indent="-228600" eaLnBrk="0" hangingPunct="0">
-              <a:defRPr sz="2900">
-                <a:solidFill>
-                  <a:schemeClr val="tx1"/>
-                </a:solidFill>
-                <a:latin typeface="Arial" charset="0"/>
-              </a:defRPr>
-            </a:lvl3pPr>
-            <a:lvl4pPr marL="1600200" indent="-228600" eaLnBrk="0" hangingPunct="0">
-              <a:defRPr sz="2900">
-                <a:solidFill>
-                  <a:schemeClr val="tx1"/>
-                </a:solidFill>
-                <a:latin typeface="Arial" charset="0"/>
-              </a:defRPr>
-            </a:lvl4pPr>
-            <a:lvl5pPr marL="2057400" indent="-228600" eaLnBrk="0" hangingPunct="0">
-              <a:defRPr sz="2900">
-                <a:solidFill>
-                  <a:schemeClr val="tx1"/>
-                </a:solidFill>
-                <a:latin typeface="Arial" charset="0"/>
-              </a:defRPr>
-            </a:lvl5pPr>
-            <a:lvl6pPr marL="2514600" indent="-228600" eaLnBrk="0" fontAlgn="base" hangingPunct="0">
-              <a:spcBef>
-                <a:spcPct val="0"/>
-              </a:spcBef>
-              <a:spcAft>
-                <a:spcPct val="0"/>
-              </a:spcAft>
-              <a:defRPr sz="2900">
-                <a:solidFill>
-                  <a:schemeClr val="tx1"/>
-                </a:solidFill>
-                <a:latin typeface="Arial" charset="0"/>
-              </a:defRPr>
-            </a:lvl6pPr>
-            <a:lvl7pPr marL="2971800" indent="-228600" eaLnBrk="0" fontAlgn="base" hangingPunct="0">
-              <a:spcBef>
-                <a:spcPct val="0"/>
-              </a:spcBef>
-              <a:spcAft>
-                <a:spcPct val="0"/>
-              </a:spcAft>
-              <a:defRPr sz="2900">
-                <a:solidFill>
-                  <a:schemeClr val="tx1"/>
-                </a:solidFill>
-                <a:latin typeface="Arial" charset="0"/>
-              </a:defRPr>
-            </a:lvl7pPr>
-            <a:lvl8pPr marL="3429000" indent="-228600" eaLnBrk="0" fontAlgn="base" hangingPunct="0">
-              <a:spcBef>
-                <a:spcPct val="0"/>
-              </a:spcBef>
-              <a:spcAft>
-                <a:spcPct val="0"/>
-              </a:spcAft>
-              <a:defRPr sz="2900">
-                <a:solidFill>
-                  <a:schemeClr val="tx1"/>
-                </a:solidFill>
-                <a:latin typeface="Arial" charset="0"/>
-              </a:defRPr>
-            </a:lvl8pPr>
-            <a:lvl9pPr marL="3886200" indent="-228600" eaLnBrk="0" fontAlgn="base" hangingPunct="0">
-              <a:spcBef>
-                <a:spcPct val="0"/>
-              </a:spcBef>
-              <a:spcAft>
-                <a:spcPct val="0"/>
-              </a:spcAft>
-              <a:defRPr sz="2900">
-                <a:solidFill>
-                  <a:schemeClr val="tx1"/>
-                </a:solidFill>
-                <a:latin typeface="Arial" charset="0"/>
-              </a:defRPr>
-            </a:lvl9pPr>
-          </a:lstStyle>
-          <a:p>
-            <a:pPr eaLnBrk="1" hangingPunct="1"/>
-            <a:endParaRPr lang="x-none" altLang="x-none" sz="2000"/>
-          </a:p>
-        </p:txBody>
-      </p:sp>
       <p:pic>
         <p:nvPicPr>
           <p:cNvPr id="1029" name="Picture 5"/>
@@ -4765,8 +4631,8 @@
         </p:blipFill>
         <p:spPr bwMode="auto">
           <a:xfrm>
-            <a:off x="993204" y="7002884"/>
-            <a:ext cx="5884263" cy="3292615"/>
+            <a:off x="288454" y="7146900"/>
+            <a:ext cx="5369518" cy="3004583"/>
           </a:xfrm>
           <a:prstGeom prst="rect">
             <a:avLst/>
@@ -4922,6 +4788,359 @@
           <a:noFill/>
         </p:spPr>
       </p:pic>
+      <p:sp>
+        <p:nvSpPr>
+          <p:cNvPr id="21" name="Rectangle 10"/>
+          <p:cNvSpPr>
+            <a:spLocks noChangeArrowheads="1"/>
+          </p:cNvSpPr>
+          <p:nvPr/>
+        </p:nvSpPr>
+        <p:spPr bwMode="auto">
+          <a:xfrm>
+            <a:off x="144438" y="2394372"/>
+            <a:ext cx="7375527" cy="3899965"/>
+          </a:xfrm>
+          <a:prstGeom prst="rect">
+            <a:avLst/>
+          </a:prstGeom>
+          <a:solidFill>
+            <a:schemeClr val="bg1"/>
+          </a:solidFill>
+          <a:ln w="9525">
+            <a:solidFill>
+              <a:schemeClr val="tx1"/>
+            </a:solidFill>
+            <a:miter lim="800000"/>
+            <a:headEnd/>
+            <a:tailEnd/>
+          </a:ln>
+        </p:spPr>
+        <p:txBody>
+          <a:bodyPr/>
+          <a:lstStyle>
+            <a:lvl1pPr eaLnBrk="0" hangingPunct="0">
+              <a:defRPr sz="2900">
+                <a:solidFill>
+                  <a:schemeClr val="tx1"/>
+                </a:solidFill>
+                <a:latin typeface="Arial" charset="0"/>
+              </a:defRPr>
+            </a:lvl1pPr>
+            <a:lvl2pPr marL="742950" indent="-285750" eaLnBrk="0" hangingPunct="0">
+              <a:defRPr sz="2900">
+                <a:solidFill>
+                  <a:schemeClr val="tx1"/>
+                </a:solidFill>
+                <a:latin typeface="Arial" charset="0"/>
+              </a:defRPr>
+            </a:lvl2pPr>
+            <a:lvl3pPr marL="1143000" indent="-228600" eaLnBrk="0" hangingPunct="0">
+              <a:defRPr sz="2900">
+                <a:solidFill>
+                  <a:schemeClr val="tx1"/>
+                </a:solidFill>
+                <a:latin typeface="Arial" charset="0"/>
+              </a:defRPr>
+            </a:lvl3pPr>
+            <a:lvl4pPr marL="1600200" indent="-228600" eaLnBrk="0" hangingPunct="0">
+              <a:defRPr sz="2900">
+                <a:solidFill>
+                  <a:schemeClr val="tx1"/>
+                </a:solidFill>
+                <a:latin typeface="Arial" charset="0"/>
+              </a:defRPr>
+            </a:lvl4pPr>
+            <a:lvl5pPr marL="2057400" indent="-228600" eaLnBrk="0" hangingPunct="0">
+              <a:defRPr sz="2900">
+                <a:solidFill>
+                  <a:schemeClr val="tx1"/>
+                </a:solidFill>
+                <a:latin typeface="Arial" charset="0"/>
+              </a:defRPr>
+            </a:lvl5pPr>
+            <a:lvl6pPr marL="2514600" indent="-228600" eaLnBrk="0" fontAlgn="base" hangingPunct="0">
+              <a:spcBef>
+                <a:spcPct val="0"/>
+              </a:spcBef>
+              <a:spcAft>
+                <a:spcPct val="0"/>
+              </a:spcAft>
+              <a:defRPr sz="2900">
+                <a:solidFill>
+                  <a:schemeClr val="tx1"/>
+                </a:solidFill>
+                <a:latin typeface="Arial" charset="0"/>
+              </a:defRPr>
+            </a:lvl6pPr>
+            <a:lvl7pPr marL="2971800" indent="-228600" eaLnBrk="0" fontAlgn="base" hangingPunct="0">
+              <a:spcBef>
+                <a:spcPct val="0"/>
+              </a:spcBef>
+              <a:spcAft>
+                <a:spcPct val="0"/>
+              </a:spcAft>
+              <a:defRPr sz="2900">
+                <a:solidFill>
+                  <a:schemeClr val="tx1"/>
+                </a:solidFill>
+                <a:latin typeface="Arial" charset="0"/>
+              </a:defRPr>
+            </a:lvl7pPr>
+            <a:lvl8pPr marL="3429000" indent="-228600" eaLnBrk="0" fontAlgn="base" hangingPunct="0">
+              <a:spcBef>
+                <a:spcPct val="0"/>
+              </a:spcBef>
+              <a:spcAft>
+                <a:spcPct val="0"/>
+              </a:spcAft>
+              <a:defRPr sz="2900">
+                <a:solidFill>
+                  <a:schemeClr val="tx1"/>
+                </a:solidFill>
+                <a:latin typeface="Arial" charset="0"/>
+              </a:defRPr>
+            </a:lvl8pPr>
+            <a:lvl9pPr marL="3886200" indent="-228600" eaLnBrk="0" fontAlgn="base" hangingPunct="0">
+              <a:spcBef>
+                <a:spcPct val="0"/>
+              </a:spcBef>
+              <a:spcAft>
+                <a:spcPct val="0"/>
+              </a:spcAft>
+              <a:defRPr sz="2900">
+                <a:solidFill>
+                  <a:schemeClr val="tx1"/>
+                </a:solidFill>
+                <a:latin typeface="Arial" charset="0"/>
+              </a:defRPr>
+            </a:lvl9pPr>
+          </a:lstStyle>
+          <a:p>
+            <a:pPr eaLnBrk="1" hangingPunct="1"/>
+            <a:endParaRPr lang="x-none" altLang="x-none" sz="2000"/>
+          </a:p>
+        </p:txBody>
+      </p:sp>
+      <p:sp>
+        <p:nvSpPr>
+          <p:cNvPr id="22" name="Text Box 6"/>
+          <p:cNvSpPr txBox="1">
+            <a:spLocks noChangeArrowheads="1"/>
+          </p:cNvSpPr>
+          <p:nvPr/>
+        </p:nvSpPr>
+        <p:spPr bwMode="auto">
+          <a:xfrm>
+            <a:off x="1872630" y="2538388"/>
+            <a:ext cx="3528392" cy="493901"/>
+          </a:xfrm>
+          <a:prstGeom prst="rect">
+            <a:avLst/>
+          </a:prstGeom>
+          <a:noFill/>
+          <a:ln>
+            <a:noFill/>
+          </a:ln>
+          <a:extLst>
+            <a:ext uri="{909E8E84-426E-40DD-AFC4-6F175D3DCCD1}">
+              <a14:hiddenFill xmlns="" xmlns:a14="http://schemas.microsoft.com/office/drawing/2010/main">
+                <a:solidFill>
+                  <a:srgbClr val="FFFFFF"/>
+                </a:solidFill>
+              </a14:hiddenFill>
+            </a:ext>
+            <a:ext uri="{91240B29-F687-4F45-9708-019B960494DF}">
+              <a14:hiddenLine xmlns="" xmlns:a14="http://schemas.microsoft.com/office/drawing/2010/main" w="9525">
+                <a:solidFill>
+                  <a:srgbClr val="000000"/>
+                </a:solidFill>
+                <a:miter lim="800000"/>
+                <a:headEnd/>
+                <a:tailEnd/>
+              </a14:hiddenLine>
+            </a:ext>
+          </a:extLst>
+        </p:spPr>
+        <p:txBody>
+          <a:bodyPr wrap="square" lIns="47165" tIns="23582" rIns="47165" bIns="23582">
+            <a:spAutoFit/>
+          </a:bodyPr>
+          <a:lstStyle>
+            <a:lvl1pPr defTabSz="1433513" eaLnBrk="0" hangingPunct="0">
+              <a:defRPr sz="2900">
+                <a:solidFill>
+                  <a:schemeClr val="tx1"/>
+                </a:solidFill>
+                <a:latin typeface="Arial" charset="0"/>
+              </a:defRPr>
+            </a:lvl1pPr>
+            <a:lvl2pPr marL="742950" indent="-285750" defTabSz="1433513" eaLnBrk="0" hangingPunct="0">
+              <a:defRPr sz="2900">
+                <a:solidFill>
+                  <a:schemeClr val="tx1"/>
+                </a:solidFill>
+                <a:latin typeface="Arial" charset="0"/>
+              </a:defRPr>
+            </a:lvl2pPr>
+            <a:lvl3pPr marL="1143000" indent="-228600" defTabSz="1433513" eaLnBrk="0" hangingPunct="0">
+              <a:defRPr sz="2900">
+                <a:solidFill>
+                  <a:schemeClr val="tx1"/>
+                </a:solidFill>
+                <a:latin typeface="Arial" charset="0"/>
+              </a:defRPr>
+            </a:lvl3pPr>
+            <a:lvl4pPr marL="1600200" indent="-228600" defTabSz="1433513" eaLnBrk="0" hangingPunct="0">
+              <a:defRPr sz="2900">
+                <a:solidFill>
+                  <a:schemeClr val="tx1"/>
+                </a:solidFill>
+                <a:latin typeface="Arial" charset="0"/>
+              </a:defRPr>
+            </a:lvl4pPr>
+            <a:lvl5pPr marL="2057400" indent="-228600" defTabSz="1433513" eaLnBrk="0" hangingPunct="0">
+              <a:defRPr sz="2900">
+                <a:solidFill>
+                  <a:schemeClr val="tx1"/>
+                </a:solidFill>
+                <a:latin typeface="Arial" charset="0"/>
+              </a:defRPr>
+            </a:lvl5pPr>
+            <a:lvl6pPr marL="2514600" indent="-228600" defTabSz="1433513" eaLnBrk="0" fontAlgn="base" hangingPunct="0">
+              <a:spcBef>
+                <a:spcPct val="0"/>
+              </a:spcBef>
+              <a:spcAft>
+                <a:spcPct val="0"/>
+              </a:spcAft>
+              <a:defRPr sz="2900">
+                <a:solidFill>
+                  <a:schemeClr val="tx1"/>
+                </a:solidFill>
+                <a:latin typeface="Arial" charset="0"/>
+              </a:defRPr>
+            </a:lvl6pPr>
+            <a:lvl7pPr marL="2971800" indent="-228600" defTabSz="1433513" eaLnBrk="0" fontAlgn="base" hangingPunct="0">
+              <a:spcBef>
+                <a:spcPct val="0"/>
+              </a:spcBef>
+              <a:spcAft>
+                <a:spcPct val="0"/>
+              </a:spcAft>
+              <a:defRPr sz="2900">
+                <a:solidFill>
+                  <a:schemeClr val="tx1"/>
+                </a:solidFill>
+                <a:latin typeface="Arial" charset="0"/>
+              </a:defRPr>
+            </a:lvl7pPr>
+            <a:lvl8pPr marL="3429000" indent="-228600" defTabSz="1433513" eaLnBrk="0" fontAlgn="base" hangingPunct="0">
+              <a:spcBef>
+                <a:spcPct val="0"/>
+              </a:spcBef>
+              <a:spcAft>
+                <a:spcPct val="0"/>
+              </a:spcAft>
+              <a:defRPr sz="2900">
+                <a:solidFill>
+                  <a:schemeClr val="tx1"/>
+                </a:solidFill>
+                <a:latin typeface="Arial" charset="0"/>
+              </a:defRPr>
+            </a:lvl8pPr>
+            <a:lvl9pPr marL="3886200" indent="-228600" defTabSz="1433513" eaLnBrk="0" fontAlgn="base" hangingPunct="0">
+              <a:spcBef>
+                <a:spcPct val="0"/>
+              </a:spcBef>
+              <a:spcAft>
+                <a:spcPct val="0"/>
+              </a:spcAft>
+              <a:defRPr sz="2900">
+                <a:solidFill>
+                  <a:schemeClr val="tx1"/>
+                </a:solidFill>
+                <a:latin typeface="Arial" charset="0"/>
+              </a:defRPr>
+            </a:lvl9pPr>
+          </a:lstStyle>
+          <a:p>
+            <a:pPr algn="ctr" eaLnBrk="1" hangingPunct="1">
+              <a:spcBef>
+                <a:spcPct val="50000"/>
+              </a:spcBef>
+            </a:pPr>
+            <a:r>
+              <a:rPr lang="en-US" altLang="x-none" dirty="0" smtClean="0"/>
+              <a:t>Features</a:t>
+            </a:r>
+          </a:p>
+        </p:txBody>
+      </p:sp>
+      <p:sp>
+        <p:nvSpPr>
+          <p:cNvPr id="23" name="TextBox 22"/>
+          <p:cNvSpPr txBox="1"/>
+          <p:nvPr/>
+        </p:nvSpPr>
+        <p:spPr>
+          <a:xfrm>
+            <a:off x="648494" y="3330476"/>
+            <a:ext cx="5976664" cy="2246769"/>
+          </a:xfrm>
+          <a:prstGeom prst="rect">
+            <a:avLst/>
+          </a:prstGeom>
+          <a:noFill/>
+        </p:spPr>
+        <p:txBody>
+          <a:bodyPr wrap="square" rtlCol="0">
+            <a:spAutoFit/>
+          </a:bodyPr>
+          <a:lstStyle/>
+          <a:p>
+            <a:pPr>
+              <a:buFont typeface="Arial" pitchFamily="34" charset="0"/>
+              <a:buChar char="•"/>
+            </a:pPr>
+            <a:r>
+              <a:rPr lang="en-GB" sz="2000" dirty="0" smtClean="0"/>
+              <a:t>1-on-1 multiplayer card game with a dark fantasy theme.</a:t>
+            </a:r>
+          </a:p>
+          <a:p>
+            <a:pPr>
+              <a:buFont typeface="Arial" pitchFamily="34" charset="0"/>
+              <a:buChar char="•"/>
+            </a:pPr>
+            <a:r>
+              <a:rPr lang="en-GB" sz="2000" dirty="0" smtClean="0"/>
+              <a:t>Gameplay designed around resource management.</a:t>
+            </a:r>
+          </a:p>
+          <a:p>
+            <a:pPr>
+              <a:buFont typeface="Arial" pitchFamily="34" charset="0"/>
+              <a:buChar char="•"/>
+            </a:pPr>
+            <a:r>
+              <a:rPr lang="en-GB" sz="2000" dirty="0" smtClean="0"/>
+              <a:t>A wide variety of cards to build your deck from.</a:t>
+            </a:r>
+          </a:p>
+          <a:p>
+            <a:pPr>
+              <a:buFont typeface="Arial" pitchFamily="34" charset="0"/>
+              <a:buChar char="•"/>
+            </a:pPr>
+            <a:r>
+              <a:rPr lang="en-GB" sz="2000" dirty="0" smtClean="0"/>
+              <a:t>Lord cards with powerful abilities that can turn the tide of battle.</a:t>
+            </a:r>
+            <a:endParaRPr lang="en-GB" sz="2000" dirty="0"/>
+          </a:p>
+        </p:txBody>
+      </p:sp>
     </p:spTree>
   </p:cSld>
   <p:clrMapOvr>
@@ -5774,15 +5993,6 @@
 </file>
 
 <file path=customXml/item1.xml><?xml version="1.0" encoding="utf-8"?>
-<?mso-contentType ?>
-<FormTemplates xmlns="http://schemas.microsoft.com/sharepoint/v3/contenttype/forms">
-  <Display>DocumentLibraryForm</Display>
-  <Edit>DocumentLibraryForm</Edit>
-  <New>DocumentLibraryForm</New>
-</FormTemplates>
-</file>
-
-<file path=customXml/item2.xml><?xml version="1.0" encoding="utf-8"?>
 <ct:contentTypeSchema xmlns:ct="http://schemas.microsoft.com/office/2006/metadata/contentType" xmlns:ma="http://schemas.microsoft.com/office/2006/metadata/properties/metaAttributes" ct:_="" ma:_="" ma:contentTypeName="Document" ma:contentTypeID="0x01010097D40E6585C8784EB4F7A91A219ECB38" ma:contentTypeVersion="0" ma:contentTypeDescription="Create a new document." ma:contentTypeScope="" ma:versionID="225f1df7c0d1d866e72199d38b91779e">
   <xsd:schema xmlns:xsd="http://www.w3.org/2001/XMLSchema" xmlns:p="http://schemas.microsoft.com/office/2006/metadata/properties" targetNamespace="http://schemas.microsoft.com/office/2006/metadata/properties" ma:root="true" ma:fieldsID="4aeb20c0e3442673af7ee10786458764">
     <xsd:element name="properties">
@@ -5831,15 +6041,16 @@
 </ct:contentTypeSchema>
 </file>
 
-<file path=customXml/itemProps1.xml><?xml version="1.0" encoding="utf-8"?>
-<ds:datastoreItem xmlns:ds="http://schemas.openxmlformats.org/officeDocument/2006/customXml" ds:itemID="{54D0D3C5-34E4-4C50-AEF0-1975AC22AD53}">
-  <ds:schemaRefs>
-    <ds:schemaRef ds:uri="http://schemas.microsoft.com/sharepoint/v3/contenttype/forms"/>
-  </ds:schemaRefs>
-</ds:datastoreItem>
+<file path=customXml/item2.xml><?xml version="1.0" encoding="utf-8"?>
+<?mso-contentType ?>
+<FormTemplates xmlns="http://schemas.microsoft.com/sharepoint/v3/contenttype/forms">
+  <Display>DocumentLibraryForm</Display>
+  <Edit>DocumentLibraryForm</Edit>
+  <New>DocumentLibraryForm</New>
+</FormTemplates>
 </file>
 
-<file path=customXml/itemProps2.xml><?xml version="1.0" encoding="utf-8"?>
+<file path=customXml/itemProps1.xml><?xml version="1.0" encoding="utf-8"?>
 <ds:datastoreItem xmlns:ds="http://schemas.openxmlformats.org/officeDocument/2006/customXml" ds:itemID="{069E428E-B4E8-4A06-9EB6-04820EC0F3C0}">
   <ds:schemaRefs>
     <ds:schemaRef ds:uri="http://schemas.microsoft.com/office/2006/metadata/contentType"/>
@@ -5852,4 +6063,12 @@
     <ds:schemaRef ds:uri="http://schemas.microsoft.com/office/internal/2005/internalDocumentation"/>
   </ds:schemaRefs>
 </ds:datastoreItem>
+</file>
+
+<file path=customXml/itemProps2.xml><?xml version="1.0" encoding="utf-8"?>
+<ds:datastoreItem xmlns:ds="http://schemas.openxmlformats.org/officeDocument/2006/customXml" ds:itemID="{54D0D3C5-34E4-4C50-AEF0-1975AC22AD53}">
+  <ds:schemaRefs>
+    <ds:schemaRef ds:uri="http://schemas.microsoft.com/sharepoint/v3/contenttype/forms"/>
+  </ds:schemaRefs>
+</ds:datastoreItem>
 </file>
</xml_diff>

<commit_message>
Added features to the poster
</commit_message>
<xml_diff>
--- a/Open Day Poster.pptx
+++ b/Open Day Poster.pptx
@@ -5086,7 +5086,7 @@
         <p:spPr>
           <a:xfrm>
             <a:off x="648494" y="3330476"/>
-            <a:ext cx="5976664" cy="2246769"/>
+            <a:ext cx="5976664" cy="1938992"/>
           </a:xfrm>
           <a:prstGeom prst="rect">
             <a:avLst/>
@@ -5105,7 +5105,7 @@
             </a:pPr>
             <a:r>
               <a:rPr lang="en-GB" sz="2000" dirty="0" smtClean="0"/>
-              <a:t>1-on-1 multiplayer card game with a dark fantasy theme.</a:t>
+              <a:t>1-on-1 online multiplayer card game with a </a:t>
             </a:r>
           </a:p>
           <a:p>
@@ -5115,7 +5115,11 @@
             </a:pPr>
             <a:r>
               <a:rPr lang="en-GB" sz="2000" dirty="0" smtClean="0"/>
-              <a:t>Gameplay designed around resource management.</a:t>
+              <a:t>D</a:t>
+            </a:r>
+            <a:r>
+              <a:rPr lang="en-GB" sz="2000" dirty="0" smtClean="0"/>
+              <a:t>ark fantasy theme.</a:t>
             </a:r>
           </a:p>
           <a:p>
@@ -5125,7 +5129,17 @@
             </a:pPr>
             <a:r>
               <a:rPr lang="en-GB" sz="2000" dirty="0" smtClean="0"/>
-              <a:t>A wide variety of cards to build your deck from.</a:t>
+              <a:t>Resource management.</a:t>
+            </a:r>
+          </a:p>
+          <a:p>
+            <a:pPr>
+              <a:buFont typeface="Arial" pitchFamily="34" charset="0"/>
+              <a:buChar char="•"/>
+            </a:pPr>
+            <a:r>
+              <a:rPr lang="en-GB" sz="2000" dirty="0" smtClean="0"/>
+              <a:t>A wide variety of cards.</a:t>
             </a:r>
           </a:p>
           <a:p>

</xml_diff>